<commit_message>
added erd for proj 3 I did change some parts of proj3 erd
</commit_message>
<xml_diff>
--- a/project/erd.pptx
+++ b/project/erd.pptx
@@ -198,7 +198,7 @@
           <a:p>
             <a:fld id="{1A447BFC-F94E-4D24-AA27-F03AC05547DB}" type="datetimeFigureOut">
               <a:rPr lang="en-US" smtClean="0"/>
-              <a:t>2/28/2017</a:t>
+              <a:t>3/24/2017</a:t>
             </a:fld>
             <a:endParaRPr lang="en-US" dirty="0"/>
           </a:p>
@@ -747,7 +747,7 @@
           <a:p>
             <a:fld id="{784474BE-3C8A-428C-8DCD-79E4E7B96DBD}" type="datetimeFigureOut">
               <a:rPr lang="en-US" smtClean="0"/>
-              <a:t>2/28/2017</a:t>
+              <a:t>3/24/2017</a:t>
             </a:fld>
             <a:endParaRPr lang="en-US" dirty="0"/>
           </a:p>
@@ -915,7 +915,7 @@
           <a:p>
             <a:fld id="{784474BE-3C8A-428C-8DCD-79E4E7B96DBD}" type="datetimeFigureOut">
               <a:rPr lang="en-US" smtClean="0"/>
-              <a:t>2/28/2017</a:t>
+              <a:t>3/24/2017</a:t>
             </a:fld>
             <a:endParaRPr lang="en-US" dirty="0"/>
           </a:p>
@@ -1093,7 +1093,7 @@
           <a:p>
             <a:fld id="{784474BE-3C8A-428C-8DCD-79E4E7B96DBD}" type="datetimeFigureOut">
               <a:rPr lang="en-US" smtClean="0"/>
-              <a:t>2/28/2017</a:t>
+              <a:t>3/24/2017</a:t>
             </a:fld>
             <a:endParaRPr lang="en-US" dirty="0"/>
           </a:p>
@@ -1340,7 +1340,7 @@
                 </a:solidFill>
               </a:rPr>
               <a:pPr/>
-              <a:t>2/28/2017</a:t>
+              <a:t>3/24/2017</a:t>
             </a:fld>
             <a:endParaRPr lang="en-US" dirty="0">
               <a:solidFill>
@@ -1540,7 +1540,7 @@
                 </a:solidFill>
               </a:rPr>
               <a:pPr/>
-              <a:t>2/28/2017</a:t>
+              <a:t>3/24/2017</a:t>
             </a:fld>
             <a:endParaRPr lang="en-US" dirty="0">
               <a:solidFill>
@@ -1817,7 +1817,7 @@
                 </a:solidFill>
               </a:rPr>
               <a:pPr/>
-              <a:t>2/28/2017</a:t>
+              <a:t>3/24/2017</a:t>
             </a:fld>
             <a:endParaRPr lang="en-US" dirty="0">
               <a:solidFill>
@@ -2134,7 +2134,7 @@
                 </a:solidFill>
               </a:rPr>
               <a:pPr/>
-              <a:t>2/28/2017</a:t>
+              <a:t>3/24/2017</a:t>
             </a:fld>
             <a:endParaRPr lang="en-US" dirty="0">
               <a:solidFill>
@@ -2585,7 +2585,7 @@
                 </a:solidFill>
               </a:rPr>
               <a:pPr/>
-              <a:t>2/28/2017</a:t>
+              <a:t>3/24/2017</a:t>
             </a:fld>
             <a:endParaRPr lang="en-US" dirty="0">
               <a:solidFill>
@@ -2734,7 +2734,7 @@
                 </a:solidFill>
               </a:rPr>
               <a:pPr/>
-              <a:t>2/28/2017</a:t>
+              <a:t>3/24/2017</a:t>
             </a:fld>
             <a:endParaRPr lang="en-US" dirty="0">
               <a:solidFill>
@@ -2861,7 +2861,7 @@
                 </a:solidFill>
               </a:rPr>
               <a:pPr/>
-              <a:t>2/28/2017</a:t>
+              <a:t>3/24/2017</a:t>
             </a:fld>
             <a:endParaRPr lang="en-US" dirty="0">
               <a:solidFill>
@@ -3168,7 +3168,7 @@
                 </a:solidFill>
               </a:rPr>
               <a:pPr/>
-              <a:t>2/28/2017</a:t>
+              <a:t>3/24/2017</a:t>
             </a:fld>
             <a:endParaRPr lang="en-US" dirty="0">
               <a:solidFill>
@@ -3361,7 +3361,7 @@
           <a:p>
             <a:fld id="{784474BE-3C8A-428C-8DCD-79E4E7B96DBD}" type="datetimeFigureOut">
               <a:rPr lang="en-US" smtClean="0"/>
-              <a:t>2/28/2017</a:t>
+              <a:t>3/24/2017</a:t>
             </a:fld>
             <a:endParaRPr lang="en-US" dirty="0"/>
           </a:p>
@@ -3620,7 +3620,7 @@
                 </a:solidFill>
               </a:rPr>
               <a:pPr/>
-              <a:t>2/28/2017</a:t>
+              <a:t>3/24/2017</a:t>
             </a:fld>
             <a:endParaRPr lang="en-US" dirty="0">
               <a:solidFill>
@@ -3820,7 +3820,7 @@
                 </a:solidFill>
               </a:rPr>
               <a:pPr/>
-              <a:t>2/28/2017</a:t>
+              <a:t>3/24/2017</a:t>
             </a:fld>
             <a:endParaRPr lang="en-US" dirty="0">
               <a:solidFill>
@@ -4030,7 +4030,7 @@
                 </a:solidFill>
               </a:rPr>
               <a:pPr/>
-              <a:t>2/28/2017</a:t>
+              <a:t>3/24/2017</a:t>
             </a:fld>
             <a:endParaRPr lang="en-US" dirty="0">
               <a:solidFill>
@@ -4300,7 +4300,7 @@
           <a:p>
             <a:fld id="{784474BE-3C8A-428C-8DCD-79E4E7B96DBD}" type="datetimeFigureOut">
               <a:rPr lang="en-US" smtClean="0"/>
-              <a:t>2/28/2017</a:t>
+              <a:t>3/24/2017</a:t>
             </a:fld>
             <a:endParaRPr lang="en-US" dirty="0"/>
           </a:p>
@@ -4529,7 +4529,7 @@
           <a:p>
             <a:fld id="{784474BE-3C8A-428C-8DCD-79E4E7B96DBD}" type="datetimeFigureOut">
               <a:rPr lang="en-US" smtClean="0"/>
-              <a:t>2/28/2017</a:t>
+              <a:t>3/24/2017</a:t>
             </a:fld>
             <a:endParaRPr lang="en-US" dirty="0"/>
           </a:p>
@@ -4893,7 +4893,7 @@
           <a:p>
             <a:fld id="{784474BE-3C8A-428C-8DCD-79E4E7B96DBD}" type="datetimeFigureOut">
               <a:rPr lang="en-US" smtClean="0"/>
-              <a:t>2/28/2017</a:t>
+              <a:t>3/24/2017</a:t>
             </a:fld>
             <a:endParaRPr lang="en-US" dirty="0"/>
           </a:p>
@@ -5010,7 +5010,7 @@
           <a:p>
             <a:fld id="{784474BE-3C8A-428C-8DCD-79E4E7B96DBD}" type="datetimeFigureOut">
               <a:rPr lang="en-US" smtClean="0"/>
-              <a:t>2/28/2017</a:t>
+              <a:t>3/24/2017</a:t>
             </a:fld>
             <a:endParaRPr lang="en-US" dirty="0"/>
           </a:p>
@@ -5105,7 +5105,7 @@
           <a:p>
             <a:fld id="{784474BE-3C8A-428C-8DCD-79E4E7B96DBD}" type="datetimeFigureOut">
               <a:rPr lang="en-US" smtClean="0"/>
-              <a:t>2/28/2017</a:t>
+              <a:t>3/24/2017</a:t>
             </a:fld>
             <a:endParaRPr lang="en-US" dirty="0"/>
           </a:p>
@@ -5380,7 +5380,7 @@
           <a:p>
             <a:fld id="{784474BE-3C8A-428C-8DCD-79E4E7B96DBD}" type="datetimeFigureOut">
               <a:rPr lang="en-US" smtClean="0"/>
-              <a:t>2/28/2017</a:t>
+              <a:t>3/24/2017</a:t>
             </a:fld>
             <a:endParaRPr lang="en-US" dirty="0"/>
           </a:p>
@@ -5632,7 +5632,7 @@
           <a:p>
             <a:fld id="{784474BE-3C8A-428C-8DCD-79E4E7B96DBD}" type="datetimeFigureOut">
               <a:rPr lang="en-US" smtClean="0"/>
-              <a:t>2/28/2017</a:t>
+              <a:t>3/24/2017</a:t>
             </a:fld>
             <a:endParaRPr lang="en-US" dirty="0"/>
           </a:p>
@@ -5843,7 +5843,7 @@
           <a:p>
             <a:fld id="{784474BE-3C8A-428C-8DCD-79E4E7B96DBD}" type="datetimeFigureOut">
               <a:rPr lang="en-US" smtClean="0"/>
-              <a:t>2/28/2017</a:t>
+              <a:t>3/24/2017</a:t>
             </a:fld>
             <a:endParaRPr lang="en-US" dirty="0"/>
           </a:p>
@@ -6388,7 +6388,7 @@
                 </a:solidFill>
               </a:rPr>
               <a:pPr/>
-              <a:t>2/28/2017</a:t>
+              <a:t>3/24/2017</a:t>
             </a:fld>
             <a:endParaRPr lang="en-US" dirty="0">
               <a:solidFill>
@@ -8727,14 +8727,20 @@
               </a:spcAft>
             </a:pPr>
             <a:r>
-              <a:rPr lang="en-US" sz="1600" dirty="0">
+              <a:rPr lang="en-US" sz="1600" dirty="0" err="1">
                 <a:solidFill>
                   <a:prstClr val="black"/>
                 </a:solidFill>
                 <a:latin typeface="Arial" charset="0"/>
               </a:rPr>
-              <a:t>Part_id</a:t>
-            </a:r>
+              <a:t>Order_total</a:t>
+            </a:r>
+            <a:endParaRPr lang="en-US" sz="1600" dirty="0">
+              <a:solidFill>
+                <a:prstClr val="black"/>
+              </a:solidFill>
+              <a:latin typeface="Arial" charset="0"/>
+            </a:endParaRPr>
           </a:p>
         </p:txBody>
       </p:sp>
@@ -10393,6 +10399,273 @@
           <a:xfrm>
             <a:off x="10151851" y="6074971"/>
             <a:ext cx="1042665" cy="141608"/>
+          </a:xfrm>
+          <a:prstGeom prst="straightConnector1">
+            <a:avLst/>
+          </a:prstGeom>
+          <a:noFill/>
+          <a:ln w="9525">
+            <a:solidFill>
+              <a:schemeClr val="tx1"/>
+            </a:solidFill>
+            <a:round/>
+            <a:headEnd/>
+            <a:tailEnd/>
+          </a:ln>
+          <a:effectLst/>
+        </p:spPr>
+      </p:cxnSp>
+      <p:sp>
+        <p:nvSpPr>
+          <p:cNvPr id="89" name="Oval 18"/>
+          <p:cNvSpPr>
+            <a:spLocks noChangeArrowheads="1"/>
+          </p:cNvSpPr>
+          <p:nvPr/>
+        </p:nvSpPr>
+        <p:spPr bwMode="auto">
+          <a:xfrm>
+            <a:off x="5473743" y="1562802"/>
+            <a:ext cx="1143000" cy="381000"/>
+          </a:xfrm>
+          <a:prstGeom prst="ellipse">
+            <a:avLst/>
+          </a:prstGeom>
+          <a:solidFill>
+            <a:schemeClr val="bg1">
+              <a:lumMod val="85000"/>
+            </a:schemeClr>
+          </a:solidFill>
+          <a:ln w="9525">
+            <a:solidFill>
+              <a:schemeClr val="tx1"/>
+            </a:solidFill>
+            <a:round/>
+            <a:headEnd/>
+            <a:tailEnd/>
+          </a:ln>
+          <a:effectLst/>
+        </p:spPr>
+        <p:txBody>
+          <a:bodyPr wrap="none" anchor="ctr"/>
+          <a:lstStyle/>
+          <a:p>
+            <a:pPr algn="ctr" eaLnBrk="0" fontAlgn="base" hangingPunct="0">
+              <a:spcBef>
+                <a:spcPct val="0"/>
+              </a:spcBef>
+              <a:spcAft>
+                <a:spcPct val="0"/>
+              </a:spcAft>
+            </a:pPr>
+            <a:r>
+              <a:rPr lang="en-US" sz="1600" dirty="0" err="1">
+                <a:solidFill>
+                  <a:prstClr val="black"/>
+                </a:solidFill>
+                <a:latin typeface="Arial" charset="0"/>
+              </a:rPr>
+              <a:t>Phone_number</a:t>
+            </a:r>
+            <a:endParaRPr lang="en-US" dirty="0">
+              <a:solidFill>
+                <a:prstClr val="black"/>
+              </a:solidFill>
+              <a:latin typeface="Arial" charset="0"/>
+            </a:endParaRPr>
+          </a:p>
+        </p:txBody>
+      </p:sp>
+      <p:cxnSp>
+        <p:nvCxnSpPr>
+          <p:cNvPr id="97" name="AutoShape 22"/>
+          <p:cNvCxnSpPr>
+            <a:cxnSpLocks noChangeShapeType="1"/>
+            <a:stCxn id="46085" idx="0"/>
+            <a:endCxn id="89" idx="1"/>
+          </p:cNvCxnSpPr>
+          <p:nvPr/>
+        </p:nvCxnSpPr>
+        <p:spPr bwMode="auto">
+          <a:xfrm>
+            <a:off x="4500132" y="855176"/>
+            <a:ext cx="1140999" cy="763422"/>
+          </a:xfrm>
+          <a:prstGeom prst="straightConnector1">
+            <a:avLst/>
+          </a:prstGeom>
+          <a:noFill/>
+          <a:ln w="9525">
+            <a:solidFill>
+              <a:schemeClr val="tx1"/>
+            </a:solidFill>
+            <a:round/>
+            <a:headEnd/>
+            <a:tailEnd/>
+          </a:ln>
+          <a:effectLst/>
+        </p:spPr>
+      </p:cxnSp>
+      <p:sp>
+        <p:nvSpPr>
+          <p:cNvPr id="98" name="Oval 20"/>
+          <p:cNvSpPr>
+            <a:spLocks noChangeArrowheads="1"/>
+          </p:cNvSpPr>
+          <p:nvPr/>
+        </p:nvSpPr>
+        <p:spPr bwMode="auto">
+          <a:xfrm>
+            <a:off x="7682394" y="2180492"/>
+            <a:ext cx="1812962" cy="381000"/>
+          </a:xfrm>
+          <a:prstGeom prst="ellipse">
+            <a:avLst/>
+          </a:prstGeom>
+          <a:solidFill>
+            <a:schemeClr val="bg1">
+              <a:lumMod val="85000"/>
+            </a:schemeClr>
+          </a:solidFill>
+          <a:ln w="9525">
+            <a:solidFill>
+              <a:schemeClr val="tx1"/>
+            </a:solidFill>
+            <a:round/>
+            <a:headEnd/>
+            <a:tailEnd/>
+          </a:ln>
+          <a:effectLst/>
+        </p:spPr>
+        <p:txBody>
+          <a:bodyPr wrap="none" anchor="ctr"/>
+          <a:lstStyle/>
+          <a:p>
+            <a:pPr algn="ctr" eaLnBrk="0" fontAlgn="base" hangingPunct="0">
+              <a:spcBef>
+                <a:spcPct val="0"/>
+              </a:spcBef>
+              <a:spcAft>
+                <a:spcPct val="0"/>
+              </a:spcAft>
+            </a:pPr>
+            <a:r>
+              <a:rPr lang="en-US" sz="1600" dirty="0" err="1">
+                <a:solidFill>
+                  <a:prstClr val="black"/>
+                </a:solidFill>
+                <a:latin typeface="Arial" charset="0"/>
+              </a:rPr>
+              <a:t>Review_Value</a:t>
+            </a:r>
+            <a:endParaRPr lang="en-US" sz="1600" dirty="0">
+              <a:solidFill>
+                <a:prstClr val="black"/>
+              </a:solidFill>
+              <a:latin typeface="Arial" charset="0"/>
+            </a:endParaRPr>
+          </a:p>
+        </p:txBody>
+      </p:sp>
+      <p:cxnSp>
+        <p:nvCxnSpPr>
+          <p:cNvPr id="100" name="AutoShape 113"/>
+          <p:cNvCxnSpPr>
+            <a:cxnSpLocks noChangeShapeType="1"/>
+            <a:stCxn id="79" idx="3"/>
+            <a:endCxn id="98" idx="0"/>
+          </p:cNvCxnSpPr>
+          <p:nvPr/>
+        </p:nvCxnSpPr>
+        <p:spPr bwMode="auto">
+          <a:xfrm>
+            <a:off x="7995341" y="1216391"/>
+            <a:ext cx="593534" cy="964101"/>
+          </a:xfrm>
+          <a:prstGeom prst="straightConnector1">
+            <a:avLst/>
+          </a:prstGeom>
+          <a:noFill/>
+          <a:ln w="9525">
+            <a:solidFill>
+              <a:schemeClr val="tx1"/>
+            </a:solidFill>
+            <a:round/>
+            <a:headEnd/>
+            <a:tailEnd/>
+          </a:ln>
+          <a:effectLst/>
+        </p:spPr>
+      </p:cxnSp>
+      <p:sp>
+        <p:nvSpPr>
+          <p:cNvPr id="101" name="Oval 20"/>
+          <p:cNvSpPr>
+            <a:spLocks noChangeArrowheads="1"/>
+          </p:cNvSpPr>
+          <p:nvPr/>
+        </p:nvSpPr>
+        <p:spPr bwMode="auto">
+          <a:xfrm>
+            <a:off x="10891875" y="3073882"/>
+            <a:ext cx="735324" cy="381000"/>
+          </a:xfrm>
+          <a:prstGeom prst="ellipse">
+            <a:avLst/>
+          </a:prstGeom>
+          <a:solidFill>
+            <a:schemeClr val="bg1">
+              <a:lumMod val="85000"/>
+            </a:schemeClr>
+          </a:solidFill>
+          <a:ln w="9525">
+            <a:solidFill>
+              <a:schemeClr val="tx1"/>
+            </a:solidFill>
+            <a:round/>
+            <a:headEnd/>
+            <a:tailEnd/>
+          </a:ln>
+          <a:effectLst/>
+        </p:spPr>
+        <p:txBody>
+          <a:bodyPr wrap="none" anchor="ctr"/>
+          <a:lstStyle/>
+          <a:p>
+            <a:pPr algn="ctr" eaLnBrk="0" fontAlgn="base" hangingPunct="0">
+              <a:spcBef>
+                <a:spcPct val="0"/>
+              </a:spcBef>
+              <a:spcAft>
+                <a:spcPct val="0"/>
+              </a:spcAft>
+            </a:pPr>
+            <a:r>
+              <a:rPr lang="en-US" sz="1600" dirty="0">
+                <a:solidFill>
+                  <a:prstClr val="black"/>
+                </a:solidFill>
+                <a:latin typeface="Arial" charset="0"/>
+              </a:rPr>
+              <a:t>Type	</a:t>
+            </a:r>
+          </a:p>
+        </p:txBody>
+      </p:sp>
+      <p:cxnSp>
+        <p:nvCxnSpPr>
+          <p:cNvPr id="102" name="AutoShape 7"/>
+          <p:cNvCxnSpPr>
+            <a:cxnSpLocks noChangeShapeType="1"/>
+            <a:stCxn id="101" idx="3"/>
+            <a:endCxn id="114" idx="2"/>
+          </p:cNvCxnSpPr>
+          <p:nvPr/>
+        </p:nvCxnSpPr>
+        <p:spPr bwMode="auto">
+          <a:xfrm flipH="1">
+            <a:off x="9695527" y="3399086"/>
+            <a:ext cx="1304034" cy="308715"/>
           </a:xfrm>
           <a:prstGeom prst="straightConnector1">
             <a:avLst/>

</xml_diff>